<commit_message>
remove temp file and password
</commit_message>
<xml_diff>
--- a/ClassMaterials/OOAndExceptions/Slides/Part1-UML-Review.pptx
+++ b/ClassMaterials/OOAndExceptions/Slides/Part1-UML-Review.pptx
@@ -5340,6 +5340,102 @@
           </a:p>
         </p:txBody>
       </p:sp>
+      <p:sp>
+        <p:nvSpPr>
+          <p:cNvPr id="2" name="TextBox 1">
+            <a:extLst>
+              <a:ext uri="{FF2B5EF4-FFF2-40B4-BE49-F238E27FC236}">
+                <a16:creationId xmlns:a16="http://schemas.microsoft.com/office/drawing/2014/main" id="{0BB695EC-421F-32CE-A5DD-39A0356C8DD8}"/>
+              </a:ext>
+            </a:extLst>
+          </p:cNvPr>
+          <p:cNvSpPr txBox="1"/>
+          <p:nvPr/>
+        </p:nvSpPr>
+        <p:spPr>
+          <a:xfrm>
+            <a:off x="3971366" y="22057"/>
+            <a:ext cx="5334001" cy="1046440"/>
+          </a:xfrm>
+          <a:prstGeom prst="rect">
+            <a:avLst/>
+          </a:prstGeom>
+          <a:noFill/>
+          <a:ln w="12700" cap="flat">
+            <a:noFill/>
+            <a:miter lim="400000"/>
+          </a:ln>
+          <a:effectLst/>
+        </p:spPr>
+        <p:style>
+          <a:lnRef idx="0">
+            <a:scrgbClr r="0" g="0" b="0"/>
+          </a:lnRef>
+          <a:fillRef idx="0">
+            <a:scrgbClr r="0" g="0" b="0"/>
+          </a:fillRef>
+          <a:effectRef idx="0">
+            <a:scrgbClr r="0" g="0" b="0"/>
+          </a:effectRef>
+          <a:fontRef idx="none"/>
+        </p:style>
+        <p:txBody>
+          <a:bodyPr wrap="square">
+            <a:spAutoFit/>
+          </a:bodyPr>
+          <a:lstStyle/>
+          <a:p>
+            <a:r>
+              <a:rPr lang="en-US" dirty="0">
+                <a:highlight>
+                  <a:srgbClr val="FFFF00"/>
+                </a:highlight>
+              </a:rPr>
+              <a:t>Today’s Attendance password</a:t>
+            </a:r>
+          </a:p>
+          <a:p>
+            <a:r>
+              <a:rPr lang="en-US" sz="4400" dirty="0">
+                <a:highlight>
+                  <a:srgbClr val="FFFF00"/>
+                </a:highlight>
+              </a:rPr>
+              <a:t>__________</a:t>
+            </a:r>
+          </a:p>
+        </p:txBody>
+      </p:sp>
+      <p:pic>
+        <p:nvPicPr>
+          <p:cNvPr id="3" name="Picture 2">
+            <a:extLst>
+              <a:ext uri="{FF2B5EF4-FFF2-40B4-BE49-F238E27FC236}">
+                <a16:creationId xmlns:a16="http://schemas.microsoft.com/office/drawing/2014/main" id="{61A9B3DA-81E4-BD62-DD1E-B7053789AE81}"/>
+              </a:ext>
+            </a:extLst>
+          </p:cNvPr>
+          <p:cNvPicPr>
+            <a:picLocks noChangeAspect="1"/>
+          </p:cNvPicPr>
+          <p:nvPr/>
+        </p:nvPicPr>
+        <p:blipFill>
+          <a:blip r:embed="rId3"/>
+          <a:stretch>
+            <a:fillRect/>
+          </a:stretch>
+        </p:blipFill>
+        <p:spPr>
+          <a:xfrm>
+            <a:off x="6714565" y="1078490"/>
+            <a:ext cx="2429435" cy="2103869"/>
+          </a:xfrm>
+          <a:prstGeom prst="rect">
+            <a:avLst/>
+          </a:prstGeom>
+        </p:spPr>
+      </p:pic>
     </p:spTree>
   </p:cSld>
   <p:clrMapOvr>
@@ -9758,6 +9854,15 @@
 </file>
 
 <file path=customXml/item1.xml><?xml version="1.0" encoding="utf-8"?>
+<?mso-contentType ?>
+<FormTemplates xmlns="http://schemas.microsoft.com/sharepoint/v3/contenttype/forms">
+  <Display>DocumentLibraryForm</Display>
+  <Edit>DocumentLibraryForm</Edit>
+  <New>DocumentLibraryForm</New>
+</FormTemplates>
+</file>
+
+<file path=customXml/item2.xml><?xml version="1.0" encoding="utf-8"?>
 <ct:contentTypeSchema xmlns:ct="http://schemas.microsoft.com/office/2006/metadata/contentType" xmlns:ma="http://schemas.microsoft.com/office/2006/metadata/properties/metaAttributes" ct:_="" ma:_="" ma:contentTypeName="Document" ma:contentTypeID="0x0101004285D81DBE5F5A448E892B34D6B8CF20" ma:contentTypeVersion="8" ma:contentTypeDescription="Create a new document." ma:contentTypeScope="" ma:versionID="ecce54155d2ea7caa9aed06c8b6b9867">
   <xsd:schema xmlns:xsd="http://www.w3.org/2001/XMLSchema" xmlns:xs="http://www.w3.org/2001/XMLSchema" xmlns:p="http://schemas.microsoft.com/office/2006/metadata/properties" xmlns:ns2="08600313-7276-4ca7-b5d3-7d86193ee0ac" xmlns:ns3="820f9cb1-409d-4c4b-8197-1d4f7dd48124" targetNamespace="http://schemas.microsoft.com/office/2006/metadata/properties" ma:root="true" ma:fieldsID="bfd7385540b70b2fe84ac888cc214377" ns2:_="" ns3:_="">
     <xsd:import namespace="08600313-7276-4ca7-b5d3-7d86193ee0ac"/>
@@ -9934,15 +10039,6 @@
 </ct:contentTypeSchema>
 </file>
 
-<file path=customXml/item2.xml><?xml version="1.0" encoding="utf-8"?>
-<?mso-contentType ?>
-<FormTemplates xmlns="http://schemas.microsoft.com/sharepoint/v3/contenttype/forms">
-  <Display>DocumentLibraryForm</Display>
-  <Edit>DocumentLibraryForm</Edit>
-  <New>DocumentLibraryForm</New>
-</FormTemplates>
-</file>
-
 <file path=customXml/item3.xml><?xml version="1.0" encoding="utf-8"?>
 <p:properties xmlns:p="http://schemas.microsoft.com/office/2006/metadata/properties" xmlns:xsi="http://www.w3.org/2001/XMLSchema-instance" xmlns:pc="http://schemas.microsoft.com/office/infopath/2007/PartnerControls">
   <documentManagement>
@@ -9955,13 +10051,28 @@
 </file>
 
 <file path=customXml/itemProps1.xml><?xml version="1.0" encoding="utf-8"?>
-<ds:datastoreItem xmlns:ds="http://schemas.openxmlformats.org/officeDocument/2006/customXml" ds:itemID="{749915E0-C9C6-4DE7-A4C1-4F6BBE656611}"/>
+<ds:datastoreItem xmlns:ds="http://schemas.openxmlformats.org/officeDocument/2006/customXml" ds:itemID="{3EBE5BB5-16D8-4951-9C8D-E0DF199895E2}">
+  <ds:schemaRefs>
+    <ds:schemaRef ds:uri="http://schemas.microsoft.com/sharepoint/v3/contenttype/forms"/>
+  </ds:schemaRefs>
+</ds:datastoreItem>
 </file>
 
 <file path=customXml/itemProps2.xml><?xml version="1.0" encoding="utf-8"?>
-<ds:datastoreItem xmlns:ds="http://schemas.openxmlformats.org/officeDocument/2006/customXml" ds:itemID="{3EBE5BB5-16D8-4951-9C8D-E0DF199895E2}">
+<ds:datastoreItem xmlns:ds="http://schemas.openxmlformats.org/officeDocument/2006/customXml" ds:itemID="{749915E0-C9C6-4DE7-A4C1-4F6BBE656611}">
   <ds:schemaRefs>
-    <ds:schemaRef ds:uri="http://schemas.microsoft.com/sharepoint/v3/contenttype/forms"/>
+    <ds:schemaRef ds:uri="http://schemas.microsoft.com/office/2006/metadata/contentType"/>
+    <ds:schemaRef ds:uri="http://schemas.microsoft.com/office/2006/metadata/properties/metaAttributes"/>
+    <ds:schemaRef ds:uri="http://www.w3.org/2001/XMLSchema"/>
+    <ds:schemaRef ds:uri="http://schemas.microsoft.com/office/2006/metadata/properties"/>
+    <ds:schemaRef ds:uri="08600313-7276-4ca7-b5d3-7d86193ee0ac"/>
+    <ds:schemaRef ds:uri="820f9cb1-409d-4c4b-8197-1d4f7dd48124"/>
+    <ds:schemaRef ds:uri="http://schemas.microsoft.com/office/2006/documentManagement/types"/>
+    <ds:schemaRef ds:uri="http://schemas.microsoft.com/office/infopath/2007/PartnerControls"/>
+    <ds:schemaRef ds:uri="http://schemas.openxmlformats.org/package/2006/metadata/core-properties"/>
+    <ds:schemaRef ds:uri="http://purl.org/dc/elements/1.1/"/>
+    <ds:schemaRef ds:uri="http://purl.org/dc/terms/"/>
+    <ds:schemaRef ds:uri="http://schemas.microsoft.com/internal/obd"/>
   </ds:schemaRefs>
 </ds:datastoreItem>
 </file>
@@ -9971,6 +10082,8 @@
   <ds:schemaRefs>
     <ds:schemaRef ds:uri="http://schemas.microsoft.com/office/2006/metadata/properties"/>
     <ds:schemaRef ds:uri="http://schemas.microsoft.com/office/infopath/2007/PartnerControls"/>
+    <ds:schemaRef ds:uri="820f9cb1-409d-4c4b-8197-1d4f7dd48124"/>
+    <ds:schemaRef ds:uri="08600313-7276-4ca7-b5d3-7d86193ee0ac"/>
   </ds:schemaRefs>
 </ds:datastoreItem>
 </file>
</xml_diff>